<commit_message>
fixes to lecture 1
</commit_message>
<xml_diff>
--- a/content/lectures/lecture1/presentation/lecture1.pptx
+++ b/content/lectures/lecture1/presentation/lecture1.pptx
@@ -19375,7 +19375,7 @@
         </p:spPr>
         <p:txBody>
           <a:bodyPr>
-            <a:normAutofit/>
+            <a:normAutofit lnSpcReduction="10000"/>
           </a:bodyPr>
           <a:lstStyle/>
           <a:p>
@@ -19385,10 +19385,10 @@
               </a:spcAft>
             </a:pPr>
             <a:r>
-              <a:rPr lang="en-US" dirty="0" smtClean="0"/>
+              <a:rPr lang="en-US" sz="3800" b="1" dirty="0"/>
               <a:t>Workload</a:t>
             </a:r>
-            <a:endParaRPr lang="en-US" dirty="0"/>
+            <a:endParaRPr lang="en-US" sz="3800" b="1" dirty="0"/>
           </a:p>
         </p:txBody>
       </p:sp>

</xml_diff>

<commit_message>
minor edits to lecture 1
</commit_message>
<xml_diff>
--- a/content/lectures/lecture1/presentation/lecture1.pptx
+++ b/content/lectures/lecture1/presentation/lecture1.pptx
@@ -19375,7 +19375,7 @@
         </p:spPr>
         <p:txBody>
           <a:bodyPr>
-            <a:normAutofit/>
+            <a:normAutofit lnSpcReduction="10000"/>
           </a:bodyPr>
           <a:lstStyle/>
           <a:p>
@@ -19385,10 +19385,10 @@
               </a:spcAft>
             </a:pPr>
             <a:r>
-              <a:rPr lang="en-US" dirty="0" smtClean="0"/>
+              <a:rPr lang="en-US" sz="3800" b="1" dirty="0"/>
               <a:t>Workload</a:t>
             </a:r>
-            <a:endParaRPr lang="en-US" dirty="0"/>
+            <a:endParaRPr lang="en-US" sz="3800" b="1" dirty="0"/>
           </a:p>
         </p:txBody>
       </p:sp>

</xml_diff>